<commit_message>
Updated stock modelling notebook.
</commit_message>
<xml_diff>
--- a/Presentations/Stock_Prediction_Capstone_Sprint2_Presentation.pptx
+++ b/Presentations/Stock_Prediction_Capstone_Sprint2_Presentation.pptx
@@ -109,6 +109,11 @@
       </a:defRPr>
     </a:lvl9pPr>
   </p:defaultTextStyle>
+  <p:extLst>
+    <p:ext uri="{EFAFB233-063F-42B5-8137-9DF3F51BA10A}">
+      <p15:sldGuideLst xmlns:p15="http://schemas.microsoft.com/office/powerpoint/2012/main"/>
+    </p:ext>
+  </p:extLst>
 </p:presentation>
 </file>
 
@@ -5833,7 +5838,7 @@
           <a:p>
             <a:fld id="{077CA944-2883-4B37-9B09-D2CF6798408A}" type="datetimeFigureOut">
               <a:rPr lang="en-CA" smtClean="0"/>
-              <a:t>2024-04-01</a:t>
+              <a:t>2024-04-02</a:t>
             </a:fld>
             <a:endParaRPr lang="en-CA"/>
           </a:p>
@@ -6033,7 +6038,7 @@
           <a:p>
             <a:fld id="{077CA944-2883-4B37-9B09-D2CF6798408A}" type="datetimeFigureOut">
               <a:rPr lang="en-CA" smtClean="0"/>
-              <a:t>2024-04-01</a:t>
+              <a:t>2024-04-02</a:t>
             </a:fld>
             <a:endParaRPr lang="en-CA"/>
           </a:p>
@@ -6243,7 +6248,7 @@
           <a:p>
             <a:fld id="{077CA944-2883-4B37-9B09-D2CF6798408A}" type="datetimeFigureOut">
               <a:rPr lang="en-CA" smtClean="0"/>
-              <a:t>2024-04-01</a:t>
+              <a:t>2024-04-02</a:t>
             </a:fld>
             <a:endParaRPr lang="en-CA"/>
           </a:p>
@@ -6443,7 +6448,7 @@
           <a:p>
             <a:fld id="{077CA944-2883-4B37-9B09-D2CF6798408A}" type="datetimeFigureOut">
               <a:rPr lang="en-CA" smtClean="0"/>
-              <a:t>2024-04-01</a:t>
+              <a:t>2024-04-02</a:t>
             </a:fld>
             <a:endParaRPr lang="en-CA"/>
           </a:p>
@@ -6719,7 +6724,7 @@
           <a:p>
             <a:fld id="{077CA944-2883-4B37-9B09-D2CF6798408A}" type="datetimeFigureOut">
               <a:rPr lang="en-CA" smtClean="0"/>
-              <a:t>2024-04-01</a:t>
+              <a:t>2024-04-02</a:t>
             </a:fld>
             <a:endParaRPr lang="en-CA"/>
           </a:p>
@@ -6987,7 +6992,7 @@
           <a:p>
             <a:fld id="{077CA944-2883-4B37-9B09-D2CF6798408A}" type="datetimeFigureOut">
               <a:rPr lang="en-CA" smtClean="0"/>
-              <a:t>2024-04-01</a:t>
+              <a:t>2024-04-02</a:t>
             </a:fld>
             <a:endParaRPr lang="en-CA"/>
           </a:p>
@@ -7402,7 +7407,7 @@
           <a:p>
             <a:fld id="{077CA944-2883-4B37-9B09-D2CF6798408A}" type="datetimeFigureOut">
               <a:rPr lang="en-CA" smtClean="0"/>
-              <a:t>2024-04-01</a:t>
+              <a:t>2024-04-02</a:t>
             </a:fld>
             <a:endParaRPr lang="en-CA"/>
           </a:p>
@@ -7544,7 +7549,7 @@
           <a:p>
             <a:fld id="{077CA944-2883-4B37-9B09-D2CF6798408A}" type="datetimeFigureOut">
               <a:rPr lang="en-CA" smtClean="0"/>
-              <a:t>2024-04-01</a:t>
+              <a:t>2024-04-02</a:t>
             </a:fld>
             <a:endParaRPr lang="en-CA"/>
           </a:p>
@@ -7657,7 +7662,7 @@
           <a:p>
             <a:fld id="{077CA944-2883-4B37-9B09-D2CF6798408A}" type="datetimeFigureOut">
               <a:rPr lang="en-CA" smtClean="0"/>
-              <a:t>2024-04-01</a:t>
+              <a:t>2024-04-02</a:t>
             </a:fld>
             <a:endParaRPr lang="en-CA"/>
           </a:p>
@@ -7970,7 +7975,7 @@
           <a:p>
             <a:fld id="{077CA944-2883-4B37-9B09-D2CF6798408A}" type="datetimeFigureOut">
               <a:rPr lang="en-CA" smtClean="0"/>
-              <a:t>2024-04-01</a:t>
+              <a:t>2024-04-02</a:t>
             </a:fld>
             <a:endParaRPr lang="en-CA"/>
           </a:p>
@@ -8259,7 +8264,7 @@
           <a:p>
             <a:fld id="{077CA944-2883-4B37-9B09-D2CF6798408A}" type="datetimeFigureOut">
               <a:rPr lang="en-CA" smtClean="0"/>
-              <a:t>2024-04-01</a:t>
+              <a:t>2024-04-02</a:t>
             </a:fld>
             <a:endParaRPr lang="en-CA"/>
           </a:p>
@@ -8502,7 +8507,7 @@
           <a:p>
             <a:fld id="{077CA944-2883-4B37-9B09-D2CF6798408A}" type="datetimeFigureOut">
               <a:rPr lang="en-CA" smtClean="0"/>
-              <a:t>2024-04-01</a:t>
+              <a:t>2024-04-02</a:t>
             </a:fld>
             <a:endParaRPr lang="en-CA"/>
           </a:p>
@@ -10709,8 +10714,16 @@
                 <a:ea typeface="+mj-ea"/>
                 <a:cs typeface="+mj-cs"/>
               </a:rPr>
-              <a:t>Baseline Models</a:t>
+              <a:t>Models</a:t>
             </a:r>
+            <a:endParaRPr lang="en-US" sz="4800" kern="1200" dirty="0">
+              <a:solidFill>
+                <a:schemeClr val="tx1"/>
+              </a:solidFill>
+              <a:latin typeface="+mj-lt"/>
+              <a:ea typeface="+mj-ea"/>
+              <a:cs typeface="+mj-cs"/>
+            </a:endParaRPr>
           </a:p>
         </p:txBody>
       </p:sp>

</xml_diff>